<commit_message>
change images to new style
</commit_message>
<xml_diff>
--- a/images/images_ppt.pptx
+++ b/images/images_ppt.pptx
@@ -288,7 +288,7 @@
           <a:p>
             <a:fld id="{12B78E75-C3A6-7F46-89BA-521D580EED88}" type="datetimeFigureOut">
               <a:rPr lang="en-US" smtClean="0"/>
-              <a:t>4/21/14</a:t>
+              <a:t>3/21/15</a:t>
             </a:fld>
             <a:endParaRPr lang="en-US"/>
           </a:p>
@@ -458,7 +458,7 @@
           <a:p>
             <a:fld id="{12B78E75-C3A6-7F46-89BA-521D580EED88}" type="datetimeFigureOut">
               <a:rPr lang="en-US" smtClean="0"/>
-              <a:t>4/21/14</a:t>
+              <a:t>3/21/15</a:t>
             </a:fld>
             <a:endParaRPr lang="en-US"/>
           </a:p>
@@ -638,7 +638,7 @@
           <a:p>
             <a:fld id="{12B78E75-C3A6-7F46-89BA-521D580EED88}" type="datetimeFigureOut">
               <a:rPr lang="en-US" smtClean="0"/>
-              <a:t>4/21/14</a:t>
+              <a:t>3/21/15</a:t>
             </a:fld>
             <a:endParaRPr lang="en-US"/>
           </a:p>
@@ -808,7 +808,7 @@
           <a:p>
             <a:fld id="{12B78E75-C3A6-7F46-89BA-521D580EED88}" type="datetimeFigureOut">
               <a:rPr lang="en-US" smtClean="0"/>
-              <a:t>4/21/14</a:t>
+              <a:t>3/21/15</a:t>
             </a:fld>
             <a:endParaRPr lang="en-US"/>
           </a:p>
@@ -1054,7 +1054,7 @@
           <a:p>
             <a:fld id="{12B78E75-C3A6-7F46-89BA-521D580EED88}" type="datetimeFigureOut">
               <a:rPr lang="en-US" smtClean="0"/>
-              <a:t>4/21/14</a:t>
+              <a:t>3/21/15</a:t>
             </a:fld>
             <a:endParaRPr lang="en-US"/>
           </a:p>
@@ -1342,7 +1342,7 @@
           <a:p>
             <a:fld id="{12B78E75-C3A6-7F46-89BA-521D580EED88}" type="datetimeFigureOut">
               <a:rPr lang="en-US" smtClean="0"/>
-              <a:t>4/21/14</a:t>
+              <a:t>3/21/15</a:t>
             </a:fld>
             <a:endParaRPr lang="en-US"/>
           </a:p>
@@ -1764,7 +1764,7 @@
           <a:p>
             <a:fld id="{12B78E75-C3A6-7F46-89BA-521D580EED88}" type="datetimeFigureOut">
               <a:rPr lang="en-US" smtClean="0"/>
-              <a:t>4/21/14</a:t>
+              <a:t>3/21/15</a:t>
             </a:fld>
             <a:endParaRPr lang="en-US"/>
           </a:p>
@@ -1882,7 +1882,7 @@
           <a:p>
             <a:fld id="{12B78E75-C3A6-7F46-89BA-521D580EED88}" type="datetimeFigureOut">
               <a:rPr lang="en-US" smtClean="0"/>
-              <a:t>4/21/14</a:t>
+              <a:t>3/21/15</a:t>
             </a:fld>
             <a:endParaRPr lang="en-US"/>
           </a:p>
@@ -1977,7 +1977,7 @@
           <a:p>
             <a:fld id="{12B78E75-C3A6-7F46-89BA-521D580EED88}" type="datetimeFigureOut">
               <a:rPr lang="en-US" smtClean="0"/>
-              <a:t>4/21/14</a:t>
+              <a:t>3/21/15</a:t>
             </a:fld>
             <a:endParaRPr lang="en-US"/>
           </a:p>
@@ -2254,7 +2254,7 @@
           <a:p>
             <a:fld id="{12B78E75-C3A6-7F46-89BA-521D580EED88}" type="datetimeFigureOut">
               <a:rPr lang="en-US" smtClean="0"/>
-              <a:t>4/21/14</a:t>
+              <a:t>3/21/15</a:t>
             </a:fld>
             <a:endParaRPr lang="en-US"/>
           </a:p>
@@ -2507,7 +2507,7 @@
           <a:p>
             <a:fld id="{12B78E75-C3A6-7F46-89BA-521D580EED88}" type="datetimeFigureOut">
               <a:rPr lang="en-US" smtClean="0"/>
-              <a:t>4/21/14</a:t>
+              <a:t>3/21/15</a:t>
             </a:fld>
             <a:endParaRPr lang="en-US"/>
           </a:p>
@@ -2720,7 +2720,7 @@
           <a:p>
             <a:fld id="{12B78E75-C3A6-7F46-89BA-521D580EED88}" type="datetimeFigureOut">
               <a:rPr lang="en-US" smtClean="0"/>
-              <a:t>4/21/14</a:t>
+              <a:t>3/21/15</a:t>
             </a:fld>
             <a:endParaRPr lang="en-US"/>
           </a:p>
@@ -3097,7 +3097,7 @@
       </p:grpSpPr>
       <p:pic>
         <p:nvPicPr>
-          <p:cNvPr id="4" name="Picture 3" descr="ui.png"/>
+          <p:cNvPr id="4" name="Picture 3"/>
           <p:cNvPicPr>
             <a:picLocks noChangeAspect="1"/>
           </p:cNvPicPr>
@@ -3117,8 +3117,8 @@
         </p:blipFill>
         <p:spPr>
           <a:xfrm>
-            <a:off x="0" y="635000"/>
-            <a:ext cx="9144000" cy="5569238"/>
+            <a:off x="-375802" y="303269"/>
+            <a:ext cx="9873773" cy="5989255"/>
           </a:xfrm>
           <a:prstGeom prst="rect">
             <a:avLst/>
@@ -3388,7 +3388,7 @@
         <p:spPr>
           <a:xfrm>
             <a:off x="0" y="4708791"/>
-            <a:ext cx="9144000" cy="2149209"/>
+            <a:ext cx="9144000" cy="1061453"/>
           </a:xfrm>
           <a:prstGeom prst="rect">
             <a:avLst/>

</xml_diff>